<commit_message>
changed lab07.pptx for some errors
</commit_message>
<xml_diff>
--- a/week07/Lab07.pptx
+++ b/week07/Lab07.pptx
@@ -5,28 +5,28 @@
     <p:sldMasterId id="2147483648" r:id="rId1"/>
   </p:sldMasterIdLst>
   <p:notesMasterIdLst>
-    <p:notesMasterId r:id="rId6"/>
+    <p:notesMasterId r:id="rId21"/>
   </p:notesMasterIdLst>
   <p:sldIdLst>
-    <p:sldId id="256" r:id="rId3"/>
-    <p:sldId id="477" r:id="rId4"/>
-    <p:sldId id="342" r:id="rId5"/>
-    <p:sldId id="429" r:id="rId7"/>
-    <p:sldId id="440" r:id="rId8"/>
-    <p:sldId id="431" r:id="rId9"/>
-    <p:sldId id="1018" r:id="rId10"/>
-    <p:sldId id="343" r:id="rId11"/>
-    <p:sldId id="1019" r:id="rId12"/>
-    <p:sldId id="433" r:id="rId13"/>
-    <p:sldId id="416" r:id="rId14"/>
-    <p:sldId id="435" r:id="rId15"/>
-    <p:sldId id="438" r:id="rId16"/>
-    <p:sldId id="454" r:id="rId17"/>
-    <p:sldId id="455" r:id="rId18"/>
-    <p:sldId id="456" r:id="rId19"/>
-    <p:sldId id="1017" r:id="rId20"/>
-    <p:sldId id="1001" r:id="rId21"/>
-    <p:sldId id="671" r:id="rId22"/>
+    <p:sldId id="256" r:id="rId2"/>
+    <p:sldId id="477" r:id="rId3"/>
+    <p:sldId id="342" r:id="rId4"/>
+    <p:sldId id="429" r:id="rId5"/>
+    <p:sldId id="440" r:id="rId6"/>
+    <p:sldId id="431" r:id="rId7"/>
+    <p:sldId id="1018" r:id="rId8"/>
+    <p:sldId id="343" r:id="rId9"/>
+    <p:sldId id="1019" r:id="rId10"/>
+    <p:sldId id="433" r:id="rId11"/>
+    <p:sldId id="416" r:id="rId12"/>
+    <p:sldId id="435" r:id="rId13"/>
+    <p:sldId id="438" r:id="rId14"/>
+    <p:sldId id="454" r:id="rId15"/>
+    <p:sldId id="455" r:id="rId16"/>
+    <p:sldId id="456" r:id="rId17"/>
+    <p:sldId id="1017" r:id="rId18"/>
+    <p:sldId id="1001" r:id="rId19"/>
+    <p:sldId id="671" r:id="rId20"/>
   </p:sldIdLst>
   <p:sldSz cx="12192000" cy="6858000"/>
   <p:notesSz cx="6858000" cy="9144000"/>
@@ -125,6 +125,11 @@
       </a:defRPr>
     </a:lvl9pPr>
   </p:defaultTextStyle>
+  <p:extLst>
+    <p:ext uri="{EFAFB233-063F-42B5-8137-9DF3F51BA10A}">
+      <p15:sldGuideLst xmlns:p15="http://schemas.microsoft.com/office/powerpoint/2012/main"/>
+    </p:ext>
+  </p:extLst>
 </p:presentation>
 </file>
 
@@ -210,6 +215,7 @@
           <a:p>
             <a:fld id="{D1237EF7-A117-46B7-88A8-1B7FB98FF0F2}" type="datetimeFigureOut">
               <a:rPr lang="zh-CN" altLang="en-US" smtClean="0"/>
+              <a:t>2021/10/23</a:t>
             </a:fld>
             <a:endParaRPr lang="zh-CN" altLang="en-US"/>
           </a:p>
@@ -276,7 +282,6 @@
               <a:rPr lang="zh-CN" altLang="en-US"/>
               <a:t>单击此处编辑母版文本样式</a:t>
             </a:r>
-            <a:endParaRPr lang="zh-CN" altLang="en-US"/>
           </a:p>
           <a:p>
             <a:pPr lvl="1"/>
@@ -284,7 +289,6 @@
               <a:rPr lang="zh-CN" altLang="en-US"/>
               <a:t>二级</a:t>
             </a:r>
-            <a:endParaRPr lang="zh-CN" altLang="en-US"/>
           </a:p>
           <a:p>
             <a:pPr lvl="2"/>
@@ -292,7 +296,6 @@
               <a:rPr lang="zh-CN" altLang="en-US"/>
               <a:t>三级</a:t>
             </a:r>
-            <a:endParaRPr lang="zh-CN" altLang="en-US"/>
           </a:p>
           <a:p>
             <a:pPr lvl="3"/>
@@ -300,7 +303,6 @@
               <a:rPr lang="zh-CN" altLang="en-US"/>
               <a:t>四级</a:t>
             </a:r>
-            <a:endParaRPr lang="zh-CN" altLang="en-US"/>
           </a:p>
           <a:p>
             <a:pPr lvl="4"/>
@@ -308,7 +310,6 @@
               <a:rPr lang="zh-CN" altLang="en-US"/>
               <a:t>五级</a:t>
             </a:r>
-            <a:endParaRPr lang="zh-CN" altLang="en-US"/>
           </a:p>
         </p:txBody>
       </p:sp>
@@ -372,6 +373,7 @@
           <a:p>
             <a:fld id="{7B705520-EB74-4E10-9207-DDFEA7EA0F0E}" type="slidenum">
               <a:rPr lang="zh-CN" altLang="en-US" smtClean="0"/>
+              <a:t>‹#›</a:t>
             </a:fld>
             <a:endParaRPr lang="zh-CN" altLang="en-US"/>
           </a:p>
@@ -581,6 +583,7 @@
                   <a:prstClr val="black"/>
                 </a:solidFill>
               </a:rPr>
+              <a:t>3</a:t>
             </a:fld>
             <a:endParaRPr lang="en-US" altLang="zh-CN">
               <a:solidFill>
@@ -704,6 +707,7 @@
                   <a:prstClr val="black"/>
                 </a:solidFill>
               </a:rPr>
+              <a:t>4</a:t>
             </a:fld>
             <a:endParaRPr lang="en-US" altLang="zh-CN">
               <a:solidFill>
@@ -827,6 +831,7 @@
                   <a:prstClr val="black"/>
                 </a:solidFill>
               </a:rPr>
+              <a:t>6</a:t>
             </a:fld>
             <a:endParaRPr lang="en-US" altLang="zh-CN">
               <a:solidFill>
@@ -950,6 +955,7 @@
                   <a:prstClr val="black"/>
                 </a:solidFill>
               </a:rPr>
+              <a:t>7</a:t>
             </a:fld>
             <a:endParaRPr lang="en-US" altLang="zh-CN">
               <a:solidFill>
@@ -1098,6 +1104,7 @@
                 <a:ea typeface="等线" panose="02010600030101010101" charset="-122"/>
                 <a:cs typeface="+mn-cs"/>
               </a:rPr>
+              <a:t>9</a:t>
             </a:fld>
             <a:endParaRPr kumimoji="0" lang="en-US" altLang="zh-CN" sz="1200" b="0" i="0" u="none" strike="noStrike" kern="1200" cap="none" spc="0" normalizeH="0" baseline="0" noProof="0">
               <a:ln>
@@ -1226,6 +1233,7 @@
                   <a:prstClr val="black"/>
                 </a:solidFill>
               </a:rPr>
+              <a:t>11</a:t>
             </a:fld>
             <a:endParaRPr lang="en-US" altLang="zh-CN">
               <a:solidFill>
@@ -1345,6 +1353,7 @@
                   <a:prstClr val="black"/>
                 </a:solidFill>
               </a:rPr>
+              <a:t>14</a:t>
             </a:fld>
             <a:endParaRPr lang="en-US" altLang="zh-CN">
               <a:solidFill>
@@ -1407,7 +1416,6 @@
               <a:rPr lang="zh-CN" altLang="en-US"/>
               <a:t>单击此处编辑母版标题样式</a:t>
             </a:r>
-            <a:endParaRPr lang="zh-CN" altLang="en-US"/>
           </a:p>
         </p:txBody>
       </p:sp>
@@ -1472,7 +1480,6 @@
               <a:rPr lang="zh-CN" altLang="en-US" dirty="0"/>
               <a:t>单击此处编辑母版副标题样式</a:t>
             </a:r>
-            <a:endParaRPr lang="zh-CN" altLang="en-US" dirty="0"/>
           </a:p>
         </p:txBody>
       </p:sp>
@@ -1493,6 +1500,7 @@
           <a:p>
             <a:fld id="{FC19A4FA-3D9A-4114-B0D5-759CBD56F1AB}" type="datetimeFigureOut">
               <a:rPr lang="zh-CN" altLang="en-US" smtClean="0"/>
+              <a:t>2021/10/23</a:t>
             </a:fld>
             <a:endParaRPr lang="zh-CN" altLang="en-US"/>
           </a:p>
@@ -1534,6 +1542,7 @@
           <a:p>
             <a:fld id="{506F4176-339E-4C4B-80E4-BBE9C4467EFE}" type="slidenum">
               <a:rPr lang="zh-CN" altLang="en-US" smtClean="0"/>
+              <a:t>‹#›</a:t>
             </a:fld>
             <a:endParaRPr lang="zh-CN" altLang="en-US"/>
           </a:p>
@@ -1614,7 +1623,6 @@
               <a:rPr lang="zh-CN" altLang="en-US"/>
               <a:t>单击此处编辑母版标题样式</a:t>
             </a:r>
-            <a:endParaRPr lang="zh-CN" altLang="en-US"/>
           </a:p>
         </p:txBody>
       </p:sp>
@@ -1638,7 +1646,6 @@
               <a:rPr lang="zh-CN" altLang="en-US"/>
               <a:t>单击此处编辑母版文本样式</a:t>
             </a:r>
-            <a:endParaRPr lang="zh-CN" altLang="en-US"/>
           </a:p>
           <a:p>
             <a:pPr lvl="1"/>
@@ -1646,7 +1653,6 @@
               <a:rPr lang="zh-CN" altLang="en-US"/>
               <a:t>第二级</a:t>
             </a:r>
-            <a:endParaRPr lang="zh-CN" altLang="en-US"/>
           </a:p>
           <a:p>
             <a:pPr lvl="2"/>
@@ -1654,7 +1660,6 @@
               <a:rPr lang="zh-CN" altLang="en-US"/>
               <a:t>第三级</a:t>
             </a:r>
-            <a:endParaRPr lang="zh-CN" altLang="en-US"/>
           </a:p>
           <a:p>
             <a:pPr lvl="3"/>
@@ -1662,7 +1667,6 @@
               <a:rPr lang="zh-CN" altLang="en-US"/>
               <a:t>第四级</a:t>
             </a:r>
-            <a:endParaRPr lang="zh-CN" altLang="en-US"/>
           </a:p>
           <a:p>
             <a:pPr lvl="4"/>
@@ -1670,7 +1674,6 @@
               <a:rPr lang="zh-CN" altLang="en-US"/>
               <a:t>第五级</a:t>
             </a:r>
-            <a:endParaRPr lang="zh-CN" altLang="en-US"/>
           </a:p>
         </p:txBody>
       </p:sp>
@@ -1691,6 +1694,7 @@
           <a:p>
             <a:fld id="{FC19A4FA-3D9A-4114-B0D5-759CBD56F1AB}" type="datetimeFigureOut">
               <a:rPr lang="zh-CN" altLang="en-US" smtClean="0"/>
+              <a:t>2021/10/23</a:t>
             </a:fld>
             <a:endParaRPr lang="zh-CN" altLang="en-US"/>
           </a:p>
@@ -1732,6 +1736,7 @@
           <a:p>
             <a:fld id="{506F4176-339E-4C4B-80E4-BBE9C4467EFE}" type="slidenum">
               <a:rPr lang="zh-CN" altLang="en-US" smtClean="0"/>
+              <a:t>‹#›</a:t>
             </a:fld>
             <a:endParaRPr lang="zh-CN" altLang="en-US"/>
           </a:p>
@@ -1786,7 +1791,6 @@
               <a:rPr lang="zh-CN" altLang="en-US"/>
               <a:t>单击此处编辑母版标题样式</a:t>
             </a:r>
-            <a:endParaRPr lang="zh-CN" altLang="en-US"/>
           </a:p>
         </p:txBody>
       </p:sp>
@@ -1815,7 +1819,6 @@
               <a:rPr lang="zh-CN" altLang="en-US"/>
               <a:t>单击此处编辑母版文本样式</a:t>
             </a:r>
-            <a:endParaRPr lang="zh-CN" altLang="en-US"/>
           </a:p>
           <a:p>
             <a:pPr lvl="1"/>
@@ -1823,7 +1826,6 @@
               <a:rPr lang="zh-CN" altLang="en-US"/>
               <a:t>第二级</a:t>
             </a:r>
-            <a:endParaRPr lang="zh-CN" altLang="en-US"/>
           </a:p>
           <a:p>
             <a:pPr lvl="2"/>
@@ -1831,7 +1833,6 @@
               <a:rPr lang="zh-CN" altLang="en-US"/>
               <a:t>第三级</a:t>
             </a:r>
-            <a:endParaRPr lang="zh-CN" altLang="en-US"/>
           </a:p>
           <a:p>
             <a:pPr lvl="3"/>
@@ -1839,7 +1840,6 @@
               <a:rPr lang="zh-CN" altLang="en-US"/>
               <a:t>第四级</a:t>
             </a:r>
-            <a:endParaRPr lang="zh-CN" altLang="en-US"/>
           </a:p>
           <a:p>
             <a:pPr lvl="4"/>
@@ -1847,7 +1847,6 @@
               <a:rPr lang="zh-CN" altLang="en-US"/>
               <a:t>第五级</a:t>
             </a:r>
-            <a:endParaRPr lang="zh-CN" altLang="en-US"/>
           </a:p>
         </p:txBody>
       </p:sp>
@@ -1868,6 +1867,7 @@
           <a:p>
             <a:fld id="{FC19A4FA-3D9A-4114-B0D5-759CBD56F1AB}" type="datetimeFigureOut">
               <a:rPr lang="zh-CN" altLang="en-US" smtClean="0"/>
+              <a:t>2021/10/23</a:t>
             </a:fld>
             <a:endParaRPr lang="zh-CN" altLang="en-US"/>
           </a:p>
@@ -1909,6 +1909,7 @@
           <a:p>
             <a:fld id="{506F4176-339E-4C4B-80E4-BBE9C4467EFE}" type="slidenum">
               <a:rPr lang="zh-CN" altLang="en-US" smtClean="0"/>
+              <a:t>‹#›</a:t>
             </a:fld>
             <a:endParaRPr lang="zh-CN" altLang="en-US"/>
           </a:p>
@@ -1963,7 +1964,6 @@
               <a:rPr lang="zh-CN" altLang="en-US" dirty="0"/>
               <a:t>单击此处编辑母版标题样式</a:t>
             </a:r>
-            <a:endParaRPr lang="zh-CN" altLang="en-US" dirty="0"/>
           </a:p>
         </p:txBody>
       </p:sp>
@@ -2003,7 +2003,6 @@
               <a:rPr lang="zh-CN" altLang="en-US" dirty="0"/>
               <a:t>单击此处编辑母版文本样式</a:t>
             </a:r>
-            <a:endParaRPr lang="zh-CN" altLang="en-US" dirty="0"/>
           </a:p>
           <a:p>
             <a:pPr lvl="1"/>
@@ -2011,7 +2010,6 @@
               <a:rPr lang="zh-CN" altLang="en-US" dirty="0"/>
               <a:t>第二级</a:t>
             </a:r>
-            <a:endParaRPr lang="zh-CN" altLang="en-US" dirty="0"/>
           </a:p>
           <a:p>
             <a:pPr lvl="2"/>
@@ -2019,7 +2017,6 @@
               <a:rPr lang="zh-CN" altLang="en-US" dirty="0"/>
               <a:t>第三级</a:t>
             </a:r>
-            <a:endParaRPr lang="zh-CN" altLang="en-US" dirty="0"/>
           </a:p>
           <a:p>
             <a:pPr lvl="3"/>
@@ -2027,7 +2024,6 @@
               <a:rPr lang="zh-CN" altLang="en-US" dirty="0"/>
               <a:t>第四级</a:t>
             </a:r>
-            <a:endParaRPr lang="zh-CN" altLang="en-US" dirty="0"/>
           </a:p>
           <a:p>
             <a:pPr lvl="4"/>
@@ -2035,7 +2031,6 @@
               <a:rPr lang="zh-CN" altLang="en-US" dirty="0"/>
               <a:t>第五级</a:t>
             </a:r>
-            <a:endParaRPr lang="zh-CN" altLang="en-US" dirty="0"/>
           </a:p>
         </p:txBody>
       </p:sp>
@@ -2056,6 +2051,7 @@
           <a:p>
             <a:fld id="{FC19A4FA-3D9A-4114-B0D5-759CBD56F1AB}" type="datetimeFigureOut">
               <a:rPr lang="zh-CN" altLang="en-US" smtClean="0"/>
+              <a:t>2021/10/23</a:t>
             </a:fld>
             <a:endParaRPr lang="zh-CN" altLang="en-US"/>
           </a:p>
@@ -2097,6 +2093,7 @@
           <a:p>
             <a:fld id="{506F4176-339E-4C4B-80E4-BBE9C4467EFE}" type="slidenum">
               <a:rPr lang="zh-CN" altLang="en-US" smtClean="0"/>
+              <a:t>‹#›</a:t>
             </a:fld>
             <a:endParaRPr lang="zh-CN" altLang="en-US"/>
           </a:p>
@@ -2179,7 +2176,6 @@
               <a:rPr lang="zh-CN" altLang="en-US"/>
               <a:t>单击此处编辑母版标题样式</a:t>
             </a:r>
-            <a:endParaRPr lang="zh-CN" altLang="en-US"/>
           </a:p>
         </p:txBody>
       </p:sp>
@@ -2208,7 +2204,6 @@
               <a:rPr lang="zh-CN" altLang="en-US"/>
               <a:t>单击此处编辑母版文本样式</a:t>
             </a:r>
-            <a:endParaRPr lang="zh-CN" altLang="en-US"/>
           </a:p>
           <a:p>
             <a:pPr lvl="1"/>
@@ -2216,7 +2211,6 @@
               <a:rPr lang="zh-CN" altLang="en-US"/>
               <a:t>第二级</a:t>
             </a:r>
-            <a:endParaRPr lang="zh-CN" altLang="en-US"/>
           </a:p>
           <a:p>
             <a:pPr lvl="2"/>
@@ -2224,7 +2218,6 @@
               <a:rPr lang="zh-CN" altLang="en-US"/>
               <a:t>第三级</a:t>
             </a:r>
-            <a:endParaRPr lang="zh-CN" altLang="en-US"/>
           </a:p>
           <a:p>
             <a:pPr lvl="3"/>
@@ -2232,7 +2225,6 @@
               <a:rPr lang="zh-CN" altLang="en-US"/>
               <a:t>第四级</a:t>
             </a:r>
-            <a:endParaRPr lang="zh-CN" altLang="en-US"/>
           </a:p>
           <a:p>
             <a:pPr lvl="4"/>
@@ -2240,7 +2232,6 @@
               <a:rPr lang="zh-CN" altLang="en-US"/>
               <a:t>第五级</a:t>
             </a:r>
-            <a:endParaRPr lang="zh-CN" altLang="en-US"/>
           </a:p>
         </p:txBody>
       </p:sp>
@@ -2269,7 +2260,6 @@
               <a:rPr lang="zh-CN" altLang="en-US"/>
               <a:t>单击此处编辑母版文本样式</a:t>
             </a:r>
-            <a:endParaRPr lang="zh-CN" altLang="en-US"/>
           </a:p>
           <a:p>
             <a:pPr lvl="1"/>
@@ -2277,7 +2267,6 @@
               <a:rPr lang="zh-CN" altLang="en-US"/>
               <a:t>第二级</a:t>
             </a:r>
-            <a:endParaRPr lang="zh-CN" altLang="en-US"/>
           </a:p>
           <a:p>
             <a:pPr lvl="2"/>
@@ -2285,7 +2274,6 @@
               <a:rPr lang="zh-CN" altLang="en-US"/>
               <a:t>第三级</a:t>
             </a:r>
-            <a:endParaRPr lang="zh-CN" altLang="en-US"/>
           </a:p>
           <a:p>
             <a:pPr lvl="3"/>
@@ -2293,7 +2281,6 @@
               <a:rPr lang="zh-CN" altLang="en-US"/>
               <a:t>第四级</a:t>
             </a:r>
-            <a:endParaRPr lang="zh-CN" altLang="en-US"/>
           </a:p>
           <a:p>
             <a:pPr lvl="4"/>
@@ -2301,7 +2288,6 @@
               <a:rPr lang="zh-CN" altLang="en-US"/>
               <a:t>第五级</a:t>
             </a:r>
-            <a:endParaRPr lang="zh-CN" altLang="en-US"/>
           </a:p>
         </p:txBody>
       </p:sp>
@@ -2322,6 +2308,7 @@
           <a:p>
             <a:fld id="{FC19A4FA-3D9A-4114-B0D5-759CBD56F1AB}" type="datetimeFigureOut">
               <a:rPr lang="zh-CN" altLang="en-US" smtClean="0"/>
+              <a:t>2021/10/23</a:t>
             </a:fld>
             <a:endParaRPr lang="zh-CN" altLang="en-US"/>
           </a:p>
@@ -2363,6 +2350,7 @@
           <a:p>
             <a:fld id="{506F4176-339E-4C4B-80E4-BBE9C4467EFE}" type="slidenum">
               <a:rPr lang="zh-CN" altLang="en-US" smtClean="0"/>
+              <a:t>‹#›</a:t>
             </a:fld>
             <a:endParaRPr lang="zh-CN" altLang="en-US"/>
           </a:p>
@@ -2445,7 +2433,6 @@
               <a:rPr lang="zh-CN" altLang="en-US"/>
               <a:t>单击此处编辑母版标题样式</a:t>
             </a:r>
-            <a:endParaRPr lang="zh-CN" altLang="en-US"/>
           </a:p>
         </p:txBody>
       </p:sp>
@@ -2511,7 +2498,6 @@
               <a:rPr lang="zh-CN" altLang="en-US"/>
               <a:t>单击此处编辑母版文本样式</a:t>
             </a:r>
-            <a:endParaRPr lang="zh-CN" altLang="en-US"/>
           </a:p>
         </p:txBody>
       </p:sp>
@@ -2540,7 +2526,6 @@
               <a:rPr lang="zh-CN" altLang="en-US"/>
               <a:t>单击此处编辑母版文本样式</a:t>
             </a:r>
-            <a:endParaRPr lang="zh-CN" altLang="en-US"/>
           </a:p>
           <a:p>
             <a:pPr lvl="1"/>
@@ -2548,7 +2533,6 @@
               <a:rPr lang="zh-CN" altLang="en-US"/>
               <a:t>第二级</a:t>
             </a:r>
-            <a:endParaRPr lang="zh-CN" altLang="en-US"/>
           </a:p>
           <a:p>
             <a:pPr lvl="2"/>
@@ -2556,7 +2540,6 @@
               <a:rPr lang="zh-CN" altLang="en-US"/>
               <a:t>第三级</a:t>
             </a:r>
-            <a:endParaRPr lang="zh-CN" altLang="en-US"/>
           </a:p>
           <a:p>
             <a:pPr lvl="3"/>
@@ -2564,7 +2547,6 @@
               <a:rPr lang="zh-CN" altLang="en-US"/>
               <a:t>第四级</a:t>
             </a:r>
-            <a:endParaRPr lang="zh-CN" altLang="en-US"/>
           </a:p>
           <a:p>
             <a:pPr lvl="4"/>
@@ -2572,7 +2554,6 @@
               <a:rPr lang="zh-CN" altLang="en-US"/>
               <a:t>第五级</a:t>
             </a:r>
-            <a:endParaRPr lang="zh-CN" altLang="en-US"/>
           </a:p>
         </p:txBody>
       </p:sp>
@@ -2638,7 +2619,6 @@
               <a:rPr lang="zh-CN" altLang="en-US"/>
               <a:t>单击此处编辑母版文本样式</a:t>
             </a:r>
-            <a:endParaRPr lang="zh-CN" altLang="en-US"/>
           </a:p>
         </p:txBody>
       </p:sp>
@@ -2667,7 +2647,6 @@
               <a:rPr lang="zh-CN" altLang="en-US"/>
               <a:t>单击此处编辑母版文本样式</a:t>
             </a:r>
-            <a:endParaRPr lang="zh-CN" altLang="en-US"/>
           </a:p>
           <a:p>
             <a:pPr lvl="1"/>
@@ -2675,7 +2654,6 @@
               <a:rPr lang="zh-CN" altLang="en-US"/>
               <a:t>第二级</a:t>
             </a:r>
-            <a:endParaRPr lang="zh-CN" altLang="en-US"/>
           </a:p>
           <a:p>
             <a:pPr lvl="2"/>
@@ -2683,7 +2661,6 @@
               <a:rPr lang="zh-CN" altLang="en-US"/>
               <a:t>第三级</a:t>
             </a:r>
-            <a:endParaRPr lang="zh-CN" altLang="en-US"/>
           </a:p>
           <a:p>
             <a:pPr lvl="3"/>
@@ -2691,7 +2668,6 @@
               <a:rPr lang="zh-CN" altLang="en-US"/>
               <a:t>第四级</a:t>
             </a:r>
-            <a:endParaRPr lang="zh-CN" altLang="en-US"/>
           </a:p>
           <a:p>
             <a:pPr lvl="4"/>
@@ -2699,7 +2675,6 @@
               <a:rPr lang="zh-CN" altLang="en-US"/>
               <a:t>第五级</a:t>
             </a:r>
-            <a:endParaRPr lang="zh-CN" altLang="en-US"/>
           </a:p>
         </p:txBody>
       </p:sp>
@@ -2720,6 +2695,7 @@
           <a:p>
             <a:fld id="{FC19A4FA-3D9A-4114-B0D5-759CBD56F1AB}" type="datetimeFigureOut">
               <a:rPr lang="zh-CN" altLang="en-US" smtClean="0"/>
+              <a:t>2021/10/23</a:t>
             </a:fld>
             <a:endParaRPr lang="zh-CN" altLang="en-US"/>
           </a:p>
@@ -2761,6 +2737,7 @@
           <a:p>
             <a:fld id="{506F4176-339E-4C4B-80E4-BBE9C4467EFE}" type="slidenum">
               <a:rPr lang="zh-CN" altLang="en-US" smtClean="0"/>
+              <a:t>‹#›</a:t>
             </a:fld>
             <a:endParaRPr lang="zh-CN" altLang="en-US"/>
           </a:p>
@@ -2847,7 +2824,6 @@
               <a:rPr lang="zh-CN" altLang="en-US"/>
               <a:t>单击此处编辑母版标题样式</a:t>
             </a:r>
-            <a:endParaRPr lang="zh-CN" altLang="en-US"/>
           </a:p>
         </p:txBody>
       </p:sp>
@@ -2967,7 +2943,6 @@
               <a:rPr lang="zh-CN" altLang="en-US"/>
               <a:t>单击此处编辑母版文本样式</a:t>
             </a:r>
-            <a:endParaRPr lang="zh-CN" altLang="en-US"/>
           </a:p>
         </p:txBody>
       </p:sp>
@@ -2988,6 +2963,7 @@
           <a:p>
             <a:fld id="{FC19A4FA-3D9A-4114-B0D5-759CBD56F1AB}" type="datetimeFigureOut">
               <a:rPr lang="zh-CN" altLang="en-US" smtClean="0"/>
+              <a:t>2021/10/23</a:t>
             </a:fld>
             <a:endParaRPr lang="zh-CN" altLang="en-US"/>
           </a:p>
@@ -3029,6 +3005,7 @@
           <a:p>
             <a:fld id="{506F4176-339E-4C4B-80E4-BBE9C4467EFE}" type="slidenum">
               <a:rPr lang="zh-CN" altLang="en-US" smtClean="0"/>
+              <a:t>‹#›</a:t>
             </a:fld>
             <a:endParaRPr lang="zh-CN" altLang="en-US"/>
           </a:p>
@@ -3106,7 +3083,6 @@
               <a:rPr lang="zh-CN" altLang="en-US"/>
               <a:t>单击此处编辑母版标题样式</a:t>
             </a:r>
-            <a:endParaRPr lang="zh-CN" altLang="en-US"/>
           </a:p>
         </p:txBody>
       </p:sp>
@@ -3127,6 +3103,7 @@
           <a:p>
             <a:fld id="{FC19A4FA-3D9A-4114-B0D5-759CBD56F1AB}" type="datetimeFigureOut">
               <a:rPr lang="zh-CN" altLang="en-US" smtClean="0"/>
+              <a:t>2021/10/23</a:t>
             </a:fld>
             <a:endParaRPr lang="zh-CN" altLang="en-US"/>
           </a:p>
@@ -3168,6 +3145,7 @@
           <a:p>
             <a:fld id="{506F4176-339E-4C4B-80E4-BBE9C4467EFE}" type="slidenum">
               <a:rPr lang="zh-CN" altLang="en-US" smtClean="0"/>
+              <a:t>‹#›</a:t>
             </a:fld>
             <a:endParaRPr lang="zh-CN" altLang="en-US"/>
           </a:p>
@@ -3215,6 +3193,7 @@
           <a:p>
             <a:fld id="{FC19A4FA-3D9A-4114-B0D5-759CBD56F1AB}" type="datetimeFigureOut">
               <a:rPr lang="zh-CN" altLang="en-US" smtClean="0"/>
+              <a:t>2021/10/23</a:t>
             </a:fld>
             <a:endParaRPr lang="zh-CN" altLang="en-US"/>
           </a:p>
@@ -3256,6 +3235,7 @@
           <a:p>
             <a:fld id="{506F4176-339E-4C4B-80E4-BBE9C4467EFE}" type="slidenum">
               <a:rPr lang="zh-CN" altLang="en-US" smtClean="0"/>
+              <a:t>‹#›</a:t>
             </a:fld>
             <a:endParaRPr lang="zh-CN" altLang="en-US"/>
           </a:p>
@@ -3314,7 +3294,6 @@
               <a:rPr lang="zh-CN" altLang="en-US"/>
               <a:t>单击此处编辑母版标题样式</a:t>
             </a:r>
-            <a:endParaRPr lang="zh-CN" altLang="en-US"/>
           </a:p>
         </p:txBody>
       </p:sp>
@@ -3371,7 +3350,6 @@
               <a:rPr lang="zh-CN" altLang="en-US"/>
               <a:t>单击此处编辑母版文本样式</a:t>
             </a:r>
-            <a:endParaRPr lang="zh-CN" altLang="en-US"/>
           </a:p>
           <a:p>
             <a:pPr lvl="1"/>
@@ -3379,7 +3357,6 @@
               <a:rPr lang="zh-CN" altLang="en-US"/>
               <a:t>第二级</a:t>
             </a:r>
-            <a:endParaRPr lang="zh-CN" altLang="en-US"/>
           </a:p>
           <a:p>
             <a:pPr lvl="2"/>
@@ -3387,7 +3364,6 @@
               <a:rPr lang="zh-CN" altLang="en-US"/>
               <a:t>第三级</a:t>
             </a:r>
-            <a:endParaRPr lang="zh-CN" altLang="en-US"/>
           </a:p>
           <a:p>
             <a:pPr lvl="3"/>
@@ -3395,7 +3371,6 @@
               <a:rPr lang="zh-CN" altLang="en-US"/>
               <a:t>第四级</a:t>
             </a:r>
-            <a:endParaRPr lang="zh-CN" altLang="en-US"/>
           </a:p>
           <a:p>
             <a:pPr lvl="4"/>
@@ -3403,7 +3378,6 @@
               <a:rPr lang="zh-CN" altLang="en-US"/>
               <a:t>第五级</a:t>
             </a:r>
-            <a:endParaRPr lang="zh-CN" altLang="en-US"/>
           </a:p>
         </p:txBody>
       </p:sp>
@@ -3469,7 +3443,6 @@
               <a:rPr lang="zh-CN" altLang="en-US"/>
               <a:t>单击此处编辑母版文本样式</a:t>
             </a:r>
-            <a:endParaRPr lang="zh-CN" altLang="en-US"/>
           </a:p>
         </p:txBody>
       </p:sp>
@@ -3490,6 +3463,7 @@
           <a:p>
             <a:fld id="{FC19A4FA-3D9A-4114-B0D5-759CBD56F1AB}" type="datetimeFigureOut">
               <a:rPr lang="zh-CN" altLang="en-US" smtClean="0"/>
+              <a:t>2021/10/23</a:t>
             </a:fld>
             <a:endParaRPr lang="zh-CN" altLang="en-US"/>
           </a:p>
@@ -3531,6 +3505,7 @@
           <a:p>
             <a:fld id="{506F4176-339E-4C4B-80E4-BBE9C4467EFE}" type="slidenum">
               <a:rPr lang="zh-CN" altLang="en-US" smtClean="0"/>
+              <a:t>‹#›</a:t>
             </a:fld>
             <a:endParaRPr lang="zh-CN" altLang="en-US"/>
           </a:p>
@@ -3589,7 +3564,6 @@
               <a:rPr lang="zh-CN" altLang="en-US"/>
               <a:t>单击此处编辑母版标题样式</a:t>
             </a:r>
-            <a:endParaRPr lang="zh-CN" altLang="en-US"/>
           </a:p>
         </p:txBody>
       </p:sp>
@@ -3716,7 +3690,6 @@
               <a:rPr lang="zh-CN" altLang="en-US"/>
               <a:t>单击此处编辑母版文本样式</a:t>
             </a:r>
-            <a:endParaRPr lang="zh-CN" altLang="en-US"/>
           </a:p>
         </p:txBody>
       </p:sp>
@@ -3737,6 +3710,7 @@
           <a:p>
             <a:fld id="{FC19A4FA-3D9A-4114-B0D5-759CBD56F1AB}" type="datetimeFigureOut">
               <a:rPr lang="zh-CN" altLang="en-US" smtClean="0"/>
+              <a:t>2021/10/23</a:t>
             </a:fld>
             <a:endParaRPr lang="zh-CN" altLang="en-US"/>
           </a:p>
@@ -3778,6 +3752,7 @@
           <a:p>
             <a:fld id="{506F4176-339E-4C4B-80E4-BBE9C4467EFE}" type="slidenum">
               <a:rPr lang="zh-CN" altLang="en-US" smtClean="0"/>
+              <a:t>‹#›</a:t>
             </a:fld>
             <a:endParaRPr lang="zh-CN" altLang="en-US"/>
           </a:p>
@@ -3842,7 +3817,6 @@
               <a:rPr lang="zh-CN" altLang="en-US" dirty="0"/>
               <a:t>单击此处编辑母版标题样式</a:t>
             </a:r>
-            <a:endParaRPr lang="zh-CN" altLang="en-US" dirty="0"/>
           </a:p>
         </p:txBody>
       </p:sp>
@@ -3876,7 +3850,6 @@
               <a:rPr lang="zh-CN" altLang="en-US" dirty="0"/>
               <a:t>单击此处编辑母版文本样式</a:t>
             </a:r>
-            <a:endParaRPr lang="zh-CN" altLang="en-US" dirty="0"/>
           </a:p>
           <a:p>
             <a:pPr lvl="1"/>
@@ -3884,7 +3857,6 @@
               <a:rPr lang="zh-CN" altLang="en-US" dirty="0"/>
               <a:t>第二级</a:t>
             </a:r>
-            <a:endParaRPr lang="zh-CN" altLang="en-US" dirty="0"/>
           </a:p>
           <a:p>
             <a:pPr lvl="2"/>
@@ -3892,7 +3864,6 @@
               <a:rPr lang="zh-CN" altLang="en-US" dirty="0"/>
               <a:t>第三级</a:t>
             </a:r>
-            <a:endParaRPr lang="zh-CN" altLang="en-US" dirty="0"/>
           </a:p>
           <a:p>
             <a:pPr lvl="3"/>
@@ -3900,7 +3871,6 @@
               <a:rPr lang="zh-CN" altLang="en-US" dirty="0"/>
               <a:t>第四级</a:t>
             </a:r>
-            <a:endParaRPr lang="zh-CN" altLang="en-US" dirty="0"/>
           </a:p>
           <a:p>
             <a:pPr lvl="4"/>
@@ -3908,7 +3878,6 @@
               <a:rPr lang="zh-CN" altLang="en-US" dirty="0"/>
               <a:t>第五级</a:t>
             </a:r>
-            <a:endParaRPr lang="zh-CN" altLang="en-US" dirty="0"/>
           </a:p>
         </p:txBody>
       </p:sp>
@@ -3947,6 +3916,7 @@
           <a:p>
             <a:fld id="{FC19A4FA-3D9A-4114-B0D5-759CBD56F1AB}" type="datetimeFigureOut">
               <a:rPr lang="zh-CN" altLang="en-US" smtClean="0"/>
+              <a:t>2021/10/23</a:t>
             </a:fld>
             <a:endParaRPr lang="zh-CN" altLang="en-US"/>
           </a:p>
@@ -4024,6 +3994,7 @@
           <a:p>
             <a:fld id="{506F4176-339E-4C4B-80E4-BBE9C4467EFE}" type="slidenum">
               <a:rPr lang="zh-CN" altLang="en-US" smtClean="0"/>
+              <a:t>‹#›</a:t>
             </a:fld>
             <a:endParaRPr lang="zh-CN" altLang="en-US"/>
           </a:p>
@@ -4038,7 +4009,7 @@
           <p:nvPr userDrawn="1"/>
         </p:nvPicPr>
         <p:blipFill>
-          <a:blip r:embed="rId12" cstate="print">
+          <a:blip r:embed="rId13" cstate="print">
             <a:extLst>
               <a:ext uri="{28A0092B-C50C-407E-A947-70E740481C1C}">
                 <a14:useLocalDpi xmlns:a14="http://schemas.microsoft.com/office/drawing/2010/main" val="0"/>
@@ -4535,12 +4506,12 @@
           <a:graphicData uri="http://schemas.openxmlformats.org/presentationml/2006/ole">
             <mc:AlternateContent xmlns:mc="http://schemas.openxmlformats.org/markup-compatibility/2006">
               <mc:Choice xmlns:v="urn:schemas-microsoft-com:vml" Requires="v">
-                <p:oleObj spid="_x0000_s44109" name="Image" r:id="rId1" imgW="4762500" imgH="6953250" progId="Photoshop.Image.13">
+                <p:oleObj spid="_x0000_s44141" name="Image" r:id="rId3" imgW="4762500" imgH="6953250" progId="Photoshop.Image.13">
                   <p:embed/>
                 </p:oleObj>
               </mc:Choice>
               <mc:Fallback>
-                <p:oleObj name="Image" r:id="rId1" imgW="4762500" imgH="6953250" progId="Photoshop.Image.13">
+                <p:oleObj name="Image" r:id="rId3" imgW="4762500" imgH="6953250" progId="Photoshop.Image.13">
                   <p:embed/>
                   <p:pic>
                     <p:nvPicPr>
@@ -4549,7 +4520,7 @@
                       <p:nvPr/>
                     </p:nvPicPr>
                     <p:blipFill>
-                      <a:blip r:embed="rId2"/>
+                      <a:blip r:embed="rId4"/>
                       <a:stretch>
                         <a:fillRect/>
                       </a:stretch>
@@ -4586,12 +4557,12 @@
           <a:graphicData uri="http://schemas.openxmlformats.org/presentationml/2006/ole">
             <mc:AlternateContent xmlns:mc="http://schemas.openxmlformats.org/markup-compatibility/2006">
               <mc:Choice xmlns:v="urn:schemas-microsoft-com:vml" Requires="v">
-                <p:oleObj spid="_x0000_s44110" name="Image" r:id="rId3" imgW="3276600" imgH="6353175" progId="Photoshop.Image.13">
+                <p:oleObj spid="_x0000_s44142" name="Image" r:id="rId5" imgW="3276600" imgH="6353175" progId="Photoshop.Image.13">
                   <p:embed/>
                 </p:oleObj>
               </mc:Choice>
               <mc:Fallback>
-                <p:oleObj name="Image" r:id="rId3" imgW="3276600" imgH="6353175" progId="Photoshop.Image.13">
+                <p:oleObj name="Image" r:id="rId5" imgW="3276600" imgH="6353175" progId="Photoshop.Image.13">
                   <p:embed/>
                   <p:pic>
                     <p:nvPicPr>
@@ -4600,7 +4571,7 @@
                       <p:nvPr/>
                     </p:nvPicPr>
                     <p:blipFill>
-                      <a:blip r:embed="rId4"/>
+                      <a:blip r:embed="rId6"/>
                       <a:stretch>
                         <a:fillRect/>
                       </a:stretch>
@@ -4629,7 +4600,7 @@
         </p:nvSpPr>
         <p:spPr>
           <a:xfrm>
-            <a:off x="541097" y="154954"/>
+            <a:off x="1249310" y="154954"/>
             <a:ext cx="2840393" cy="343812"/>
           </a:xfrm>
           <a:prstGeom prst="rect">
@@ -5006,7 +4977,6 @@
                 <a:rPr lang="en-US" altLang="zh-CN" sz="1635" dirty="0"/>
                 <a:t>Function </a:t>
               </a:r>
-              <a:endParaRPr lang="en-US" altLang="zh-CN" sz="1635" dirty="0"/>
             </a:p>
             <a:p>
               <a:r>
@@ -5048,12 +5018,12 @@
             <a:graphicData uri="http://schemas.openxmlformats.org/presentationml/2006/ole">
               <mc:AlternateContent xmlns:mc="http://schemas.openxmlformats.org/markup-compatibility/2006">
                 <mc:Choice xmlns:v="urn:schemas-microsoft-com:vml" Requires="v">
-                  <p:oleObj spid="_x0000_s44111" name="Image" r:id="rId5" imgW="2600325" imgH="1514475" progId="Photoshop.Image.13">
+                  <p:oleObj spid="_x0000_s44143" name="Image" r:id="rId7" imgW="2600325" imgH="1514475" progId="Photoshop.Image.13">
                     <p:embed/>
                   </p:oleObj>
                 </mc:Choice>
                 <mc:Fallback>
-                  <p:oleObj name="Image" r:id="rId5" imgW="2600325" imgH="1514475" progId="Photoshop.Image.13">
+                  <p:oleObj name="Image" r:id="rId7" imgW="2600325" imgH="1514475" progId="Photoshop.Image.13">
                     <p:embed/>
                     <p:pic>
                       <p:nvPicPr>
@@ -5062,7 +5032,7 @@
                         <p:nvPr/>
                       </p:nvPicPr>
                       <p:blipFill>
-                        <a:blip r:embed="rId6"/>
+                        <a:blip r:embed="rId8"/>
                         <a:stretch>
                           <a:fillRect/>
                         </a:stretch>
@@ -5420,7 +5390,6 @@
               <a:rPr lang="en-US" altLang="zh-CN" sz="4000" dirty="0"/>
               <a:t>Recursive function</a:t>
             </a:r>
-            <a:endParaRPr lang="en-US" altLang="zh-CN" sz="4000" dirty="0"/>
           </a:p>
         </p:txBody>
       </p:sp>
@@ -5672,7 +5641,6 @@
               <a:rPr lang="en-US" sz="2400" dirty="0"/>
               <a:t>  </a:t>
             </a:r>
-            <a:endParaRPr lang="en-US" sz="2400" dirty="0"/>
           </a:p>
         </p:txBody>
       </p:sp>
@@ -5874,7 +5842,6 @@
               <a:rPr lang="en-US" sz="2400" dirty="0"/>
               <a:t>is used to indicate the base case.</a:t>
             </a:r>
-            <a:endParaRPr lang="en-US" sz="2400" dirty="0"/>
           </a:p>
           <a:p>
             <a:pPr marL="109220" lvl="1" indent="0">
@@ -5888,7 +5855,6 @@
               <a:rPr lang="en-US" sz="2400" dirty="0"/>
               <a:t>  </a:t>
             </a:r>
-            <a:endParaRPr lang="en-US" sz="2400" dirty="0"/>
           </a:p>
         </p:txBody>
       </p:sp>
@@ -6011,12 +5977,12 @@
           <a:graphicData uri="http://schemas.openxmlformats.org/presentationml/2006/ole">
             <mc:AlternateContent xmlns:mc="http://schemas.openxmlformats.org/markup-compatibility/2006">
               <mc:Choice xmlns:v="urn:schemas-microsoft-com:vml" Requires="v">
-                <p:oleObj spid="_x0000_s34870" name="Image" r:id="rId1" imgW="5943600" imgH="6705600" progId="Photoshop.Image.13">
+                <p:oleObj spid="_x0000_s34892" name="Image" r:id="rId3" imgW="5943600" imgH="6705600" progId="Photoshop.Image.13">
                   <p:embed/>
                 </p:oleObj>
               </mc:Choice>
               <mc:Fallback>
-                <p:oleObj name="Image" r:id="rId1" imgW="5943600" imgH="6705600" progId="Photoshop.Image.13">
+                <p:oleObj name="Image" r:id="rId3" imgW="5943600" imgH="6705600" progId="Photoshop.Image.13">
                   <p:embed/>
                   <p:pic>
                     <p:nvPicPr>
@@ -6025,7 +5991,7 @@
                       <p:nvPr/>
                     </p:nvPicPr>
                     <p:blipFill>
-                      <a:blip r:embed="rId2"/>
+                      <a:blip r:embed="rId4"/>
                       <a:stretch>
                         <a:fillRect/>
                       </a:stretch>
@@ -6224,11 +6190,6 @@
               </a:rPr>
               <a:t>with recursive function</a:t>
             </a:r>
-            <a:endParaRPr lang="en-US" sz="2400" dirty="0">
-              <a:solidFill>
-                <a:srgbClr val="FF0000"/>
-              </a:solidFill>
-            </a:endParaRPr>
           </a:p>
           <a:p>
             <a:pPr marL="109220" lvl="1" indent="0">
@@ -6282,11 +6243,6 @@
               </a:rPr>
               <a:t>  </a:t>
             </a:r>
-            <a:endParaRPr lang="en-US" sz="2400" dirty="0">
-              <a:solidFill>
-                <a:prstClr val="black"/>
-              </a:solidFill>
-            </a:endParaRPr>
           </a:p>
         </p:txBody>
       </p:sp>
@@ -6330,7 +6286,6 @@
                 <a:rPr lang="en-US" altLang="zh-CN" sz="2000" dirty="0"/>
                 <a:t>Calling itself until the function</a:t>
               </a:r>
-              <a:endParaRPr lang="en-US" altLang="zh-CN" sz="2000" dirty="0"/>
             </a:p>
             <a:p>
               <a:r>
@@ -6499,7 +6454,7 @@
           <p:nvPr/>
         </p:nvPicPr>
         <p:blipFill>
-          <a:blip r:embed="rId3">
+          <a:blip r:embed="rId5">
             <a:extLst>
               <a:ext uri="{28A0092B-C50C-407E-A947-70E740481C1C}">
                 <a14:useLocalDpi xmlns:a14="http://schemas.microsoft.com/office/drawing/2010/main" val="0"/>
@@ -6563,7 +6518,7 @@
           <p:nvPr/>
         </p:nvPicPr>
         <p:blipFill>
-          <a:blip r:embed="rId4">
+          <a:blip r:embed="rId6">
             <a:extLst>
               <a:ext uri="{28A0092B-C50C-407E-A947-70E740481C1C}">
                 <a14:useLocalDpi xmlns:a14="http://schemas.microsoft.com/office/drawing/2010/main" val="0"/>
@@ -6686,12 +6641,12 @@
             <a:graphicData uri="http://schemas.openxmlformats.org/presentationml/2006/ole">
               <mc:AlternateContent xmlns:mc="http://schemas.openxmlformats.org/markup-compatibility/2006">
                 <mc:Choice xmlns:v="urn:schemas-microsoft-com:vml" Requires="v">
-                  <p:oleObj spid="_x0000_s34871" name="Image" r:id="rId5" imgW="2333625" imgH="676275" progId="Photoshop.Image.13">
+                  <p:oleObj spid="_x0000_s34893" name="Image" r:id="rId7" imgW="2333625" imgH="676275" progId="Photoshop.Image.13">
                     <p:embed/>
                   </p:oleObj>
                 </mc:Choice>
                 <mc:Fallback>
-                  <p:oleObj name="Image" r:id="rId5" imgW="2333625" imgH="676275" progId="Photoshop.Image.13">
+                  <p:oleObj name="Image" r:id="rId7" imgW="2333625" imgH="676275" progId="Photoshop.Image.13">
                     <p:embed/>
                     <p:pic>
                       <p:nvPicPr>
@@ -6700,7 +6655,7 @@
                         <p:nvPr/>
                       </p:nvPicPr>
                       <p:blipFill>
-                        <a:blip r:embed="rId6"/>
+                        <a:blip r:embed="rId8"/>
                         <a:stretch>
                           <a:fillRect/>
                         </a:stretch>
@@ -7198,7 +7153,7 @@
         </p:nvSpPr>
         <p:spPr>
           <a:xfrm>
-            <a:off x="1770639" y="159023"/>
+            <a:off x="1770639" y="499683"/>
             <a:ext cx="4261616" cy="523220"/>
           </a:xfrm>
           <a:prstGeom prst="rect">
@@ -7236,7 +7191,7 @@
         </p:nvSpPr>
         <p:spPr>
           <a:xfrm>
-            <a:off x="439271" y="895360"/>
+            <a:off x="439271" y="1729079"/>
             <a:ext cx="11537576" cy="2677656"/>
           </a:xfrm>
           <a:prstGeom prst="rect">
@@ -7286,11 +7241,6 @@
               </a:rPr>
               <a:t>. Because it needs to make a function call so the program must save all its current state and retrieve them again later. This consumes more  time making recursive programs slower.</a:t>
             </a:r>
-            <a:endParaRPr lang="en-US" altLang="zh-CN" sz="2400" dirty="0">
-              <a:solidFill>
-                <a:prstClr val="black"/>
-              </a:solidFill>
-            </a:endParaRPr>
           </a:p>
           <a:p>
             <a:endParaRPr lang="en-US" altLang="zh-CN" sz="2400" dirty="0">
@@ -7507,7 +7457,6 @@
               <a:rPr lang="en-US" altLang="zh-CN" sz="3600" dirty="0"/>
               <a:t>Pointers to Functions(Function Pointer)</a:t>
             </a:r>
-            <a:endParaRPr lang="en-US" altLang="zh-CN" sz="3600" dirty="0"/>
           </a:p>
         </p:txBody>
       </p:sp>
@@ -7717,11 +7666,6 @@
               </a:rPr>
               <a:t>  </a:t>
             </a:r>
-            <a:endParaRPr lang="en-US" sz="2400" dirty="0">
-              <a:solidFill>
-                <a:prstClr val="black"/>
-              </a:solidFill>
-            </a:endParaRPr>
           </a:p>
         </p:txBody>
       </p:sp>
@@ -7793,9 +7737,6 @@
               </a:rPr>
               <a:t>Example:</a:t>
             </a:r>
-            <a:endParaRPr lang="en-US" altLang="zh-CN" sz="2400" dirty="0">
-              <a:ea typeface="宋体" panose="02010600030101010101" pitchFamily="2" charset="-122"/>
-            </a:endParaRPr>
           </a:p>
           <a:p>
             <a:pPr lvl="1" algn="l">
@@ -7854,9 +7795,6 @@
               </a:rPr>
               <a:t>);</a:t>
             </a:r>
-            <a:endParaRPr lang="en-US" altLang="zh-CN" sz="2400" dirty="0">
-              <a:ea typeface="宋体" panose="02010600030101010101" pitchFamily="2" charset="-122"/>
-            </a:endParaRPr>
           </a:p>
           <a:p>
             <a:pPr lvl="1" algn="l">
@@ -7927,9 +7865,6 @@
               </a:rPr>
               <a:t>);</a:t>
             </a:r>
-            <a:endParaRPr lang="en-US" altLang="zh-CN" sz="2400" dirty="0">
-              <a:ea typeface="宋体" panose="02010600030101010101" pitchFamily="2" charset="-122"/>
-            </a:endParaRPr>
           </a:p>
           <a:p>
             <a:pPr lvl="1" algn="l">
@@ -7964,9 +7899,6 @@
               </a:rPr>
               <a:t>;</a:t>
             </a:r>
-            <a:endParaRPr lang="en-US" altLang="zh-CN" sz="2400" dirty="0">
-              <a:ea typeface="宋体" panose="02010600030101010101" pitchFamily="2" charset="-122"/>
-            </a:endParaRPr>
           </a:p>
           <a:p>
             <a:pPr lvl="1" algn="l">
@@ -8001,9 +7933,6 @@
               </a:rPr>
               <a:t>(3,5);</a:t>
             </a:r>
-            <a:endParaRPr lang="en-US" altLang="zh-CN" sz="2400" dirty="0">
-              <a:ea typeface="宋体" panose="02010600030101010101" pitchFamily="2" charset="-122"/>
-            </a:endParaRPr>
           </a:p>
         </p:txBody>
       </p:sp>
@@ -8741,11 +8670,6 @@
               </a:rPr>
               <a:t>: Do not omit the () of the pointer when your declare a function pointer.</a:t>
             </a:r>
-            <a:endParaRPr lang="en-US" sz="2400" dirty="0">
-              <a:solidFill>
-                <a:prstClr val="black"/>
-              </a:solidFill>
-            </a:endParaRPr>
           </a:p>
           <a:p>
             <a:pPr marL="109220" lvl="1" indent="0">
@@ -8763,11 +8687,6 @@
               </a:rPr>
               <a:t>  </a:t>
             </a:r>
-            <a:endParaRPr lang="en-US" sz="2400" dirty="0">
-              <a:solidFill>
-                <a:prstClr val="black"/>
-              </a:solidFill>
-            </a:endParaRPr>
           </a:p>
         </p:txBody>
       </p:sp>
@@ -9109,7 +9028,7 @@
           <p:nvPr/>
         </p:nvPicPr>
         <p:blipFill>
-          <a:blip r:embed="rId1">
+          <a:blip r:embed="rId2">
             <a:extLst>
               <a:ext uri="{28A0092B-C50C-407E-A947-70E740481C1C}">
                 <a14:useLocalDpi xmlns:a14="http://schemas.microsoft.com/office/drawing/2010/main" val="0"/>
@@ -9329,11 +9248,6 @@
               </a:rPr>
               <a:t> Example:</a:t>
             </a:r>
-            <a:endParaRPr lang="en-US" sz="2400" dirty="0">
-              <a:solidFill>
-                <a:prstClr val="black"/>
-              </a:solidFill>
-            </a:endParaRPr>
           </a:p>
           <a:p>
             <a:pPr marL="109220" lvl="1" indent="0">
@@ -9373,11 +9287,6 @@
               </a:rPr>
               <a:t>calculate the following definite integrals</a:t>
             </a:r>
-            <a:endParaRPr lang="en-US" sz="2400" dirty="0">
-              <a:solidFill>
-                <a:prstClr val="black"/>
-              </a:solidFill>
-            </a:endParaRPr>
           </a:p>
           <a:p>
             <a:pPr marL="109220" lvl="1" indent="0">
@@ -9395,11 +9304,6 @@
               </a:rPr>
               <a:t>  </a:t>
             </a:r>
-            <a:endParaRPr lang="en-US" sz="2400" dirty="0">
-              <a:solidFill>
-                <a:prstClr val="black"/>
-              </a:solidFill>
-            </a:endParaRPr>
           </a:p>
         </p:txBody>
       </p:sp>
@@ -9412,7 +9316,7 @@
           <p:nvPr/>
         </p:nvPicPr>
         <p:blipFill>
-          <a:blip r:embed="rId2">
+          <a:blip r:embed="rId3">
             <a:extLst>
               <a:ext uri="{28A0092B-C50C-407E-A947-70E740481C1C}">
                 <a14:useLocalDpi xmlns:a14="http://schemas.microsoft.com/office/drawing/2010/main" val="0"/>
@@ -9453,7 +9357,7 @@
           <p:nvPr/>
         </p:nvPicPr>
         <p:blipFill>
-          <a:blip r:embed="rId3">
+          <a:blip r:embed="rId4">
             <a:extLst>
               <a:ext uri="{28A0092B-C50C-407E-A947-70E740481C1C}">
                 <a14:useLocalDpi xmlns:a14="http://schemas.microsoft.com/office/drawing/2010/main" val="0"/>
@@ -10530,7 +10434,7 @@
             <p:nvPr/>
           </p:nvPicPr>
           <p:blipFill>
-            <a:blip r:embed="rId1">
+            <a:blip r:embed="rId3">
               <a:extLst>
                 <a:ext uri="{28A0092B-C50C-407E-A947-70E740481C1C}">
                   <a14:useLocalDpi xmlns:a14="http://schemas.microsoft.com/office/drawing/2010/main" val="0"/>
@@ -10625,7 +10529,7 @@
           <p:nvPr/>
         </p:nvPicPr>
         <p:blipFill>
-          <a:blip r:embed="rId2">
+          <a:blip r:embed="rId4">
             <a:extLst>
               <a:ext uri="{28A0092B-C50C-407E-A947-70E740481C1C}">
                 <a14:useLocalDpi xmlns:a14="http://schemas.microsoft.com/office/drawing/2010/main" val="0"/>
@@ -10684,7 +10588,7 @@
           <p:nvPr/>
         </p:nvPicPr>
         <p:blipFill>
-          <a:blip r:embed="rId3">
+          <a:blip r:embed="rId5">
             <a:extLst>
               <a:ext uri="{28A0092B-C50C-407E-A947-70E740481C1C}">
                 <a14:useLocalDpi xmlns:a14="http://schemas.microsoft.com/office/drawing/2010/main" val="0"/>
@@ -10732,12 +10636,12 @@
           <a:graphicData uri="http://schemas.openxmlformats.org/presentationml/2006/ole">
             <mc:AlternateContent xmlns:mc="http://schemas.openxmlformats.org/markup-compatibility/2006">
               <mc:Choice xmlns:v="urn:schemas-microsoft-com:vml" Requires="v">
-                <p:oleObj spid="_x0000_s35894" name="Image" r:id="rId4" imgW="819150" imgH="542925" progId="Photoshop.Image.13">
+                <p:oleObj spid="_x0000_s35916" name="Image" r:id="rId6" imgW="819150" imgH="542925" progId="Photoshop.Image.13">
                   <p:embed/>
                 </p:oleObj>
               </mc:Choice>
               <mc:Fallback>
-                <p:oleObj name="Image" r:id="rId4" imgW="819150" imgH="542925" progId="Photoshop.Image.13">
+                <p:oleObj name="Image" r:id="rId6" imgW="819150" imgH="542925" progId="Photoshop.Image.13">
                   <p:embed/>
                   <p:pic>
                     <p:nvPicPr>
@@ -10746,7 +10650,7 @@
                       <p:nvPr/>
                     </p:nvPicPr>
                     <p:blipFill>
-                      <a:blip r:embed="rId5"/>
+                      <a:blip r:embed="rId7"/>
                       <a:stretch>
                         <a:fillRect/>
                       </a:stretch>
@@ -10783,12 +10687,12 @@
           <a:graphicData uri="http://schemas.openxmlformats.org/presentationml/2006/ole">
             <mc:AlternateContent xmlns:mc="http://schemas.openxmlformats.org/markup-compatibility/2006">
               <mc:Choice xmlns:v="urn:schemas-microsoft-com:vml" Requires="v">
-                <p:oleObj spid="_x0000_s35895" name="Image" r:id="rId6" imgW="1123950" imgH="561975" progId="Photoshop.Image.13">
+                <p:oleObj spid="_x0000_s35917" name="Image" r:id="rId8" imgW="1123950" imgH="561975" progId="Photoshop.Image.13">
                   <p:embed/>
                 </p:oleObj>
               </mc:Choice>
               <mc:Fallback>
-                <p:oleObj name="Image" r:id="rId6" imgW="1123950" imgH="561975" progId="Photoshop.Image.13">
+                <p:oleObj name="Image" r:id="rId8" imgW="1123950" imgH="561975" progId="Photoshop.Image.13">
                   <p:embed/>
                   <p:pic>
                     <p:nvPicPr>
@@ -10797,7 +10701,7 @@
                       <p:nvPr/>
                     </p:nvPicPr>
                     <p:blipFill>
-                      <a:blip r:embed="rId7"/>
+                      <a:blip r:embed="rId9"/>
                       <a:stretch>
                         <a:fillRect/>
                       </a:stretch>
@@ -11682,13 +11586,6 @@
               </a:rPr>
               <a:t>Define a default arguments function to display a square of any character.</a:t>
             </a:r>
-            <a:endParaRPr lang="en-US" altLang="zh-CN" sz="2400" b="0" i="0" dirty="0">
-              <a:solidFill>
-                <a:srgbClr val="24292F"/>
-              </a:solidFill>
-              <a:effectLst/>
-              <a:latin typeface="-apple-system"/>
-            </a:endParaRPr>
           </a:p>
           <a:p>
             <a:pPr marL="0" indent="0" algn="l">
@@ -11739,12 +11636,6 @@
               </a:rPr>
               <a:t>);</a:t>
             </a:r>
-            <a:endParaRPr lang="en-US" altLang="zh-CN" sz="2400" b="1" dirty="0">
-              <a:solidFill>
-                <a:srgbClr val="24292F"/>
-              </a:solidFill>
-              <a:latin typeface="-apple-system"/>
-            </a:endParaRPr>
           </a:p>
           <a:p>
             <a:pPr marL="0" indent="0" algn="l">
@@ -11800,13 +11691,6 @@
               </a:rPr>
               <a:t> is ‘#’, the function displays as follows:</a:t>
             </a:r>
-            <a:endParaRPr lang="en-US" altLang="zh-CN" sz="2400" b="0" i="0" dirty="0">
-              <a:solidFill>
-                <a:srgbClr val="24292F"/>
-              </a:solidFill>
-              <a:effectLst/>
-              <a:latin typeface="-apple-system"/>
-            </a:endParaRPr>
           </a:p>
           <a:p>
             <a:pPr marL="0" indent="0" algn="l">
@@ -11920,13 +11804,6 @@
               </a:rPr>
               <a:t> is ‘*’.</a:t>
             </a:r>
-            <a:endParaRPr lang="en-US" altLang="zh-CN" sz="2400" b="0" i="0" dirty="0">
-              <a:solidFill>
-                <a:srgbClr val="24292F"/>
-              </a:solidFill>
-              <a:effectLst/>
-              <a:latin typeface="-apple-system"/>
-            </a:endParaRPr>
           </a:p>
           <a:p>
             <a:pPr marL="0" indent="0" algn="l">
@@ -11990,7 +11867,7 @@
           <p:nvPr/>
         </p:nvPicPr>
         <p:blipFill>
-          <a:blip r:embed="rId1"/>
+          <a:blip r:embed="rId2"/>
           <a:stretch>
             <a:fillRect/>
           </a:stretch>
@@ -12114,7 +11991,6 @@
               <a:rPr lang="en-US" altLang="zh-CN" sz="2400" dirty="0"/>
               <a:t>.</a:t>
             </a:r>
-            <a:endParaRPr lang="en-US" altLang="zh-CN" sz="2400" dirty="0"/>
           </a:p>
           <a:p>
             <a:endParaRPr lang="en-US" altLang="zh-CN" sz="2400" dirty="0"/>
@@ -12192,7 +12068,6 @@
               <a:rPr lang="en-US" altLang="zh-CN" dirty="0"/>
               <a:t>Exercise 3</a:t>
             </a:r>
-            <a:endParaRPr lang="en-US" altLang="zh-CN" dirty="0"/>
           </a:p>
         </p:txBody>
       </p:sp>
@@ -12400,7 +12275,6 @@
               <a:rPr lang="en-US" altLang="zh-CN" dirty="0"/>
               <a:t> to determine the smaller of two arguments. Test the program using integer, character and floating-point number arguments.</a:t>
             </a:r>
-            <a:endParaRPr lang="en-US" altLang="zh-CN" dirty="0"/>
           </a:p>
         </p:txBody>
       </p:sp>
@@ -12457,13 +12331,6 @@
               </a:rPr>
               <a:t>Functions</a:t>
             </a:r>
-            <a:endParaRPr lang="en-US" altLang="zh-CN" b="1" i="0" dirty="0">
-              <a:solidFill>
-                <a:srgbClr val="24292F"/>
-              </a:solidFill>
-              <a:effectLst/>
-              <a:latin typeface="-apple-system"/>
-            </a:endParaRPr>
           </a:p>
         </p:txBody>
       </p:sp>
@@ -12492,9 +12359,6 @@
               </a:rPr>
               <a:t>Function overloading</a:t>
             </a:r>
-            <a:endParaRPr lang="en-US" altLang="zh-CN" dirty="0">
-              <a:sym typeface="+mn-ea"/>
-            </a:endParaRPr>
           </a:p>
           <a:p>
             <a:pPr marL="285750" indent="-285750">
@@ -12507,9 +12371,6 @@
               </a:rPr>
               <a:t>Function template</a:t>
             </a:r>
-            <a:endParaRPr lang="en-US" altLang="zh-CN" dirty="0">
-              <a:sym typeface="+mn-ea"/>
-            </a:endParaRPr>
           </a:p>
           <a:p>
             <a:pPr marL="285750" indent="-285750">
@@ -12522,9 +12383,6 @@
               </a:rPr>
               <a:t>Recursive function</a:t>
             </a:r>
-            <a:endParaRPr lang="en-US" altLang="zh-CN" dirty="0">
-              <a:sym typeface="+mn-ea"/>
-            </a:endParaRPr>
           </a:p>
           <a:p>
             <a:pPr marL="285750" indent="-285750">
@@ -12537,9 +12395,6 @@
               </a:rPr>
               <a:t>Pointers to functions</a:t>
             </a:r>
-            <a:endParaRPr lang="en-US" altLang="zh-CN" dirty="0">
-              <a:sym typeface="+mn-ea"/>
-            </a:endParaRPr>
           </a:p>
           <a:p>
             <a:pPr marL="0" indent="0">
@@ -12602,7 +12457,6 @@
               <a:rPr lang="en-US" altLang="zh-CN" sz="4000" dirty="0"/>
               <a:t> Inline Function</a:t>
             </a:r>
-            <a:endParaRPr lang="en-US" altLang="zh-CN" sz="4000" dirty="0"/>
           </a:p>
         </p:txBody>
       </p:sp>
@@ -12644,7 +12498,6 @@
               <a:rPr lang="en-US" altLang="zh-CN" sz="2540" dirty="0"/>
               <a:t>to help reduce function-call overhead(to avoid a </a:t>
             </a:r>
-            <a:endParaRPr lang="en-US" altLang="zh-CN" sz="2540" dirty="0"/>
           </a:p>
           <a:p>
             <a:r>
@@ -12718,7 +12571,6 @@
               <a:rPr lang="en-US" altLang="zh-CN" sz="4000" dirty="0"/>
               <a:t>Default Arguments</a:t>
             </a:r>
-            <a:endParaRPr lang="en-US" altLang="zh-CN" sz="4000" dirty="0"/>
           </a:p>
         </p:txBody>
       </p:sp>
@@ -12831,7 +12683,6 @@
               <a:rPr lang="en-US" altLang="zh-CN" sz="4000" dirty="0"/>
               <a:t> Function Overloading  in C++</a:t>
             </a:r>
-            <a:endParaRPr lang="en-US" altLang="zh-CN" sz="4000" dirty="0"/>
           </a:p>
         </p:txBody>
       </p:sp>
@@ -12873,11 +12724,6 @@
               </a:rPr>
               <a:t>is used to create several functions of  the same name that </a:t>
             </a:r>
-            <a:endParaRPr lang="en-US" altLang="zh-CN" sz="2540" dirty="0">
-              <a:solidFill>
-                <a:prstClr val="black"/>
-              </a:solidFill>
-            </a:endParaRPr>
           </a:p>
           <a:p>
             <a:r>
@@ -12888,11 +12734,6 @@
               </a:rPr>
               <a:t>perform similar tasks, but of different data types. The C++ compiler selects the </a:t>
             </a:r>
-            <a:endParaRPr lang="en-US" altLang="zh-CN" sz="2540" dirty="0">
-              <a:solidFill>
-                <a:prstClr val="black"/>
-              </a:solidFill>
-            </a:endParaRPr>
           </a:p>
           <a:p>
             <a:r>
@@ -12903,11 +12744,6 @@
               </a:rPr>
               <a:t>the proper function to call by examining the number, types and order of the </a:t>
             </a:r>
-            <a:endParaRPr lang="en-US" altLang="zh-CN" sz="2540" dirty="0">
-              <a:solidFill>
-                <a:prstClr val="black"/>
-              </a:solidFill>
-            </a:endParaRPr>
           </a:p>
           <a:p>
             <a:r>
@@ -12964,11 +12800,6 @@
               </a:rPr>
               <a:t>the same fuction name</a:t>
             </a:r>
-            <a:endParaRPr lang="zh-CN" altLang="en-US" sz="2540" dirty="0">
-              <a:solidFill>
-                <a:srgbClr val="FF0000"/>
-              </a:solidFill>
-            </a:endParaRPr>
           </a:p>
           <a:p>
             <a:r>
@@ -12979,11 +12810,6 @@
               </a:rPr>
               <a:t>2.different parameter list</a:t>
             </a:r>
-            <a:endParaRPr lang="en-US" altLang="zh-CN" sz="2540" dirty="0">
-              <a:solidFill>
-                <a:srgbClr val="FF0000"/>
-              </a:solidFill>
-            </a:endParaRPr>
           </a:p>
         </p:txBody>
       </p:sp>
@@ -13240,8 +13066,8 @@
         </p:nvSpPr>
         <p:spPr>
           <a:xfrm>
-            <a:off x="335360" y="210674"/>
-            <a:ext cx="6577891" cy="523220"/>
+            <a:off x="2057628" y="338243"/>
+            <a:ext cx="5157502" cy="523220"/>
           </a:xfrm>
           <a:prstGeom prst="rect">
             <a:avLst/>
@@ -13255,12 +13081,8 @@
           <a:lstStyle/>
           <a:p>
             <a:r>
-              <a:rPr lang="en-US" altLang="zh-CN" sz="2800" dirty="0"/>
-              <a:t>There are </a:t>
-            </a:r>
-            <a:r>
               <a:rPr lang="en-US" altLang="zh-CN" sz="2800" b="1" dirty="0"/>
-              <a:t>three ways </a:t>
+              <a:t>Three ways </a:t>
             </a:r>
             <a:r>
               <a:rPr lang="en-US" altLang="zh-CN" sz="2800" dirty="0"/>
@@ -13278,7 +13100,7 @@
         </p:nvGrpSpPr>
         <p:grpSpPr>
           <a:xfrm>
-            <a:off x="738938" y="824438"/>
+            <a:off x="1376554" y="1005554"/>
             <a:ext cx="2934521" cy="1080200"/>
             <a:chOff x="422138" y="824438"/>
             <a:chExt cx="2934521" cy="1080200"/>
@@ -13380,7 +13202,6 @@
                 <a:rPr lang="en-US" altLang="zh-CN" sz="2000" dirty="0"/>
                 <a:t>);</a:t>
               </a:r>
-              <a:endParaRPr lang="en-US" altLang="zh-CN" sz="2000" dirty="0"/>
             </a:p>
             <a:p>
               <a:r>
@@ -13448,7 +13269,7 @@
         </p:nvGrpSpPr>
         <p:grpSpPr>
           <a:xfrm>
-            <a:off x="712336" y="2051996"/>
+            <a:off x="1351594" y="2051996"/>
             <a:ext cx="3026791" cy="1148787"/>
             <a:chOff x="395536" y="2051995"/>
             <a:chExt cx="3026791" cy="1148787"/>
@@ -13550,7 +13371,6 @@
                 <a:rPr lang="en-US" altLang="zh-CN" sz="2000" dirty="0"/>
                 <a:t>);</a:t>
               </a:r>
-              <a:endParaRPr lang="en-US" altLang="zh-CN" sz="2000" dirty="0"/>
             </a:p>
             <a:p>
               <a:r>
@@ -13582,7 +13402,7 @@
         </p:nvGrpSpPr>
         <p:grpSpPr>
           <a:xfrm>
-            <a:off x="640327" y="3184974"/>
+            <a:off x="1247154" y="3207733"/>
             <a:ext cx="4406976" cy="1077218"/>
             <a:chOff x="323528" y="3184974"/>
             <a:chExt cx="4406976" cy="1077218"/>
@@ -13672,7 +13492,6 @@
                 <a:rPr lang="en-US" altLang="zh-CN" sz="2000" dirty="0"/>
                 <a:t>);</a:t>
               </a:r>
-              <a:endParaRPr lang="en-US" altLang="zh-CN" sz="2000" dirty="0"/>
             </a:p>
             <a:p>
               <a:r>
@@ -13712,7 +13531,7 @@
         </p:nvGrpSpPr>
         <p:grpSpPr>
           <a:xfrm>
-            <a:off x="551384" y="4581128"/>
+            <a:off x="995482" y="4614330"/>
             <a:ext cx="11017224" cy="1422722"/>
             <a:chOff x="234585" y="4581128"/>
             <a:chExt cx="11017224" cy="1422722"/>
@@ -13806,7 +13625,6 @@
                 <a:rPr lang="en-US" altLang="zh-CN" sz="2000" dirty="0"/>
                 <a:t>);</a:t>
               </a:r>
-              <a:endParaRPr lang="en-US" altLang="zh-CN" sz="2000" dirty="0"/>
             </a:p>
             <a:p>
               <a:r>
@@ -13868,7 +13686,6 @@
               <a:rPr lang="en-US" altLang="zh-CN" dirty="0"/>
               <a:t>A function with default arguments omitted might be called identically to another overloaded function, which causes a compilation error.</a:t>
             </a:r>
-            <a:endParaRPr lang="en-US" altLang="zh-CN" dirty="0"/>
           </a:p>
           <a:p>
             <a:r>
@@ -14192,12 +14009,12 @@
             <a:graphicData uri="http://schemas.openxmlformats.org/presentationml/2006/ole">
               <mc:AlternateContent xmlns:mc="http://schemas.openxmlformats.org/markup-compatibility/2006">
                 <mc:Choice xmlns:v="urn:schemas-microsoft-com:vml" Requires="v">
-                  <p:oleObj spid="_x0000_s39988" name="Image" r:id="rId1" imgW="4991100" imgH="3695700" progId="Photoshop.Image.13">
+                  <p:oleObj spid="_x0000_s40010" name="Image" r:id="rId4" imgW="4991100" imgH="3695700" progId="Photoshop.Image.13">
                     <p:embed/>
                   </p:oleObj>
                 </mc:Choice>
                 <mc:Fallback>
-                  <p:oleObj name="Image" r:id="rId1" imgW="4991100" imgH="3695700" progId="Photoshop.Image.13">
+                  <p:oleObj name="Image" r:id="rId4" imgW="4991100" imgH="3695700" progId="Photoshop.Image.13">
                     <p:embed/>
                     <p:pic>
                       <p:nvPicPr>
@@ -14206,7 +14023,7 @@
                         <p:nvPr/>
                       </p:nvPicPr>
                       <p:blipFill>
-                        <a:blip r:embed="rId2"/>
+                        <a:blip r:embed="rId5"/>
                         <a:stretch>
                           <a:fillRect/>
                         </a:stretch>
@@ -14243,12 +14060,12 @@
             <a:graphicData uri="http://schemas.openxmlformats.org/presentationml/2006/ole">
               <mc:AlternateContent xmlns:mc="http://schemas.openxmlformats.org/markup-compatibility/2006">
                 <mc:Choice xmlns:v="urn:schemas-microsoft-com:vml" Requires="v">
-                  <p:oleObj spid="_x0000_s39989" name="Image" r:id="rId3" imgW="5676900" imgH="4705350" progId="Photoshop.Image.13">
+                  <p:oleObj spid="_x0000_s40011" name="Image" r:id="rId6" imgW="5676900" imgH="4705350" progId="Photoshop.Image.13">
                     <p:embed/>
                   </p:oleObj>
                 </mc:Choice>
                 <mc:Fallback>
-                  <p:oleObj name="Image" r:id="rId3" imgW="5676900" imgH="4705350" progId="Photoshop.Image.13">
+                  <p:oleObj name="Image" r:id="rId6" imgW="5676900" imgH="4705350" progId="Photoshop.Image.13">
                     <p:embed/>
                     <p:pic>
                       <p:nvPicPr>
@@ -14257,7 +14074,7 @@
                         <p:nvPr/>
                       </p:nvPicPr>
                       <p:blipFill>
-                        <a:blip r:embed="rId4"/>
+                        <a:blip r:embed="rId7"/>
                         <a:stretch>
                           <a:fillRect/>
                         </a:stretch>
@@ -14305,7 +14122,6 @@
               <a:rPr lang="en-US" altLang="zh-CN" sz="4000" dirty="0"/>
               <a:t>Function Templates</a:t>
             </a:r>
-            <a:endParaRPr lang="en-US" altLang="zh-CN" sz="4000" dirty="0"/>
           </a:p>
         </p:txBody>
       </p:sp>
@@ -14592,7 +14408,6 @@
                 <a:rPr lang="en-US" altLang="zh-CN" sz="1635" dirty="0"/>
                 <a:t>These two functions are overloaded functions</a:t>
               </a:r>
-              <a:endParaRPr lang="en-US" altLang="zh-CN" sz="1635" dirty="0"/>
             </a:p>
             <a:p>
               <a:r>
@@ -14765,12 +14580,12 @@
           <a:graphicData uri="http://schemas.openxmlformats.org/presentationml/2006/ole">
             <mc:AlternateContent xmlns:mc="http://schemas.openxmlformats.org/markup-compatibility/2006">
               <mc:Choice xmlns:v="urn:schemas-microsoft-com:vml" Requires="v">
-                <p:oleObj spid="_x0000_s41012" name="Image" r:id="rId1" imgW="2705100" imgH="904875" progId="Photoshop.Image.13">
+                <p:oleObj spid="_x0000_s41034" name="Image" r:id="rId4" imgW="2705100" imgH="904875" progId="Photoshop.Image.13">
                   <p:embed/>
                 </p:oleObj>
               </mc:Choice>
               <mc:Fallback>
-                <p:oleObj name="Image" r:id="rId1" imgW="2705100" imgH="904875" progId="Photoshop.Image.13">
+                <p:oleObj name="Image" r:id="rId4" imgW="2705100" imgH="904875" progId="Photoshop.Image.13">
                   <p:embed/>
                   <p:pic>
                     <p:nvPicPr>
@@ -14779,7 +14594,7 @@
                       <p:nvPr/>
                     </p:nvPicPr>
                     <p:blipFill>
-                      <a:blip r:embed="rId2"/>
+                      <a:blip r:embed="rId5"/>
                       <a:stretch>
                         <a:fillRect/>
                       </a:stretch>
@@ -14816,12 +14631,12 @@
           <a:graphicData uri="http://schemas.openxmlformats.org/presentationml/2006/ole">
             <mc:AlternateContent xmlns:mc="http://schemas.openxmlformats.org/markup-compatibility/2006">
               <mc:Choice xmlns:v="urn:schemas-microsoft-com:vml" Requires="v">
-                <p:oleObj spid="_x0000_s41013" name="Image" r:id="rId3" imgW="2476500" imgH="1000125" progId="Photoshop.Image.13">
+                <p:oleObj spid="_x0000_s41035" name="Image" r:id="rId6" imgW="2476500" imgH="1000125" progId="Photoshop.Image.13">
                   <p:embed/>
                 </p:oleObj>
               </mc:Choice>
               <mc:Fallback>
-                <p:oleObj name="Image" r:id="rId3" imgW="2476500" imgH="1000125" progId="Photoshop.Image.13">
+                <p:oleObj name="Image" r:id="rId6" imgW="2476500" imgH="1000125" progId="Photoshop.Image.13">
                   <p:embed/>
                   <p:pic>
                     <p:nvPicPr>
@@ -14830,7 +14645,7 @@
                       <p:nvPr/>
                     </p:nvPicPr>
                     <p:blipFill>
-                      <a:blip r:embed="rId4"/>
+                      <a:blip r:embed="rId7"/>
                       <a:stretch>
                         <a:fillRect/>
                       </a:stretch>
@@ -14859,7 +14674,7 @@
         </p:nvSpPr>
         <p:spPr>
           <a:xfrm>
-            <a:off x="618905" y="974144"/>
+            <a:off x="1145635" y="948041"/>
             <a:ext cx="9067527" cy="371640"/>
           </a:xfrm>
           <a:prstGeom prst="rect">
@@ -14897,7 +14712,7 @@
         </p:nvSpPr>
         <p:spPr>
           <a:xfrm>
-            <a:off x="618900" y="2442563"/>
+            <a:off x="1022311" y="2505605"/>
             <a:ext cx="7409245" cy="343812"/>
           </a:xfrm>
           <a:prstGeom prst="rect">
@@ -14931,7 +14746,6 @@
               <a:rPr lang="en-US" altLang="zh-CN" sz="1635" dirty="0"/>
               <a:t>.</a:t>
             </a:r>
-            <a:endParaRPr lang="en-US" altLang="zh-CN" sz="1635" dirty="0"/>
           </a:p>
         </p:txBody>
       </p:sp>
@@ -14977,7 +14791,6 @@
               <a:rPr lang="en-US" altLang="zh-CN" sz="1635" dirty="0"/>
               <a:t>!</a:t>
             </a:r>
-            <a:endParaRPr lang="en-US" altLang="zh-CN" sz="1635" dirty="0"/>
           </a:p>
         </p:txBody>
       </p:sp>
@@ -15065,11 +14878,6 @@
               </a:rPr>
               <a:t>template</a:t>
             </a:r>
-            <a:endParaRPr lang="zh-CN" altLang="en-US" sz="1815" b="1" dirty="0">
-              <a:solidFill>
-                <a:srgbClr val="FF0000"/>
-              </a:solidFill>
-            </a:endParaRPr>
           </a:p>
           <a:p>
             <a:pPr marL="259080" indent="-259080">
@@ -15123,7 +14931,6 @@
               <a:rPr lang="en-US" altLang="zh-CN" sz="1815" dirty="0"/>
               <a:t>is a template argument that accepts different data types</a:t>
             </a:r>
-            <a:endParaRPr lang="en-US" altLang="zh-CN" sz="1815" dirty="0"/>
           </a:p>
         </p:txBody>
       </p:sp>
@@ -15136,7 +14943,7 @@
           <p:nvPr/>
         </p:nvPicPr>
         <p:blipFill>
-          <a:blip r:embed="rId5">
+          <a:blip r:embed="rId8">
             <a:extLst>
               <a:ext uri="{28A0092B-C50C-407E-A947-70E740481C1C}">
                 <a14:useLocalDpi xmlns:a14="http://schemas.microsoft.com/office/drawing/2010/main" val="0"/>
@@ -15416,14 +15223,12 @@
                 <a:rPr lang="en-US" altLang="zh-CN" sz="1635" dirty="0"/>
                 <a:t>These two functions are overloaded functions</a:t>
               </a:r>
-              <a:endParaRPr lang="en-US" altLang="zh-CN" sz="1635" dirty="0"/>
             </a:p>
             <a:p>
               <a:r>
                 <a:rPr lang="en-US" altLang="zh-CN" sz="1635" dirty="0"/>
                 <a:t>Their program logic and operations are identical</a:t>
               </a:r>
-              <a:endParaRPr lang="en-US" altLang="zh-CN" sz="1635" dirty="0"/>
             </a:p>
             <a:p>
               <a:r>
@@ -15930,12 +15735,12 @@
           <a:graphicData uri="http://schemas.openxmlformats.org/presentationml/2006/ole">
             <mc:AlternateContent xmlns:mc="http://schemas.openxmlformats.org/markup-compatibility/2006">
               <mc:Choice xmlns:v="urn:schemas-microsoft-com:vml" Requires="v">
-                <p:oleObj spid="_x0000_s42111" name="Image" r:id="rId1" imgW="5429250" imgH="3067050" progId="Photoshop.Image.13">
+                <p:oleObj spid="_x0000_s42163" name="Image" r:id="rId3" imgW="5429250" imgH="3067050" progId="Photoshop.Image.13">
                   <p:embed/>
                 </p:oleObj>
               </mc:Choice>
               <mc:Fallback>
-                <p:oleObj name="Image" r:id="rId1" imgW="5429250" imgH="3067050" progId="Photoshop.Image.13">
+                <p:oleObj name="Image" r:id="rId3" imgW="5429250" imgH="3067050" progId="Photoshop.Image.13">
                   <p:embed/>
                   <p:pic>
                     <p:nvPicPr>
@@ -15944,7 +15749,7 @@
                       <p:nvPr/>
                     </p:nvPicPr>
                     <p:blipFill>
-                      <a:blip r:embed="rId2"/>
+                      <a:blip r:embed="rId4"/>
                       <a:stretch>
                         <a:fillRect/>
                       </a:stretch>
@@ -15973,8 +15778,8 @@
         </p:nvSpPr>
         <p:spPr>
           <a:xfrm>
-            <a:off x="4016847" y="238282"/>
-            <a:ext cx="3725017" cy="595291"/>
+            <a:off x="2303929" y="569978"/>
+            <a:ext cx="5437935" cy="343940"/>
           </a:xfrm>
           <a:prstGeom prst="rect">
             <a:avLst/>
@@ -15991,7 +15796,6 @@
               <a:rPr lang="en-US" altLang="zh-CN" sz="1635" dirty="0"/>
               <a:t>compile internally generates and adds right code respectively.</a:t>
             </a:r>
-            <a:endParaRPr lang="en-US" altLang="zh-CN" sz="1635" dirty="0"/>
           </a:p>
         </p:txBody>
       </p:sp>
@@ -16109,12 +15913,12 @@
             <a:graphicData uri="http://schemas.openxmlformats.org/presentationml/2006/ole">
               <mc:AlternateContent xmlns:mc="http://schemas.openxmlformats.org/markup-compatibility/2006">
                 <mc:Choice xmlns:v="urn:schemas-microsoft-com:vml" Requires="v">
-                  <p:oleObj spid="_x0000_s42112" name="Image" r:id="rId3" imgW="2362200" imgH="942975" progId="Photoshop.Image.13">
+                  <p:oleObj spid="_x0000_s42164" name="Image" r:id="rId5" imgW="2362200" imgH="942975" progId="Photoshop.Image.13">
                     <p:embed/>
                   </p:oleObj>
                 </mc:Choice>
                 <mc:Fallback>
-                  <p:oleObj name="Image" r:id="rId3" imgW="2362200" imgH="942975" progId="Photoshop.Image.13">
+                  <p:oleObj name="Image" r:id="rId5" imgW="2362200" imgH="942975" progId="Photoshop.Image.13">
                     <p:embed/>
                     <p:pic>
                       <p:nvPicPr>
@@ -16123,7 +15927,7 @@
                         <p:nvPr/>
                       </p:nvPicPr>
                       <p:blipFill>
-                        <a:blip r:embed="rId4"/>
+                        <a:blip r:embed="rId6"/>
                         <a:stretch>
                           <a:fillRect/>
                         </a:stretch>
@@ -16259,12 +16063,12 @@
             <a:graphicData uri="http://schemas.openxmlformats.org/presentationml/2006/ole">
               <mc:AlternateContent xmlns:mc="http://schemas.openxmlformats.org/markup-compatibility/2006">
                 <mc:Choice xmlns:v="urn:schemas-microsoft-com:vml" Requires="v">
-                  <p:oleObj spid="_x0000_s42113" name="Image" r:id="rId5" imgW="2647950" imgH="933450" progId="Photoshop.Image.13">
+                  <p:oleObj spid="_x0000_s42165" name="Image" r:id="rId7" imgW="2647950" imgH="933450" progId="Photoshop.Image.13">
                     <p:embed/>
                   </p:oleObj>
                 </mc:Choice>
                 <mc:Fallback>
-                  <p:oleObj name="Image" r:id="rId5" imgW="2647950" imgH="933450" progId="Photoshop.Image.13">
+                  <p:oleObj name="Image" r:id="rId7" imgW="2647950" imgH="933450" progId="Photoshop.Image.13">
                     <p:embed/>
                     <p:pic>
                       <p:nvPicPr>
@@ -16273,7 +16077,7 @@
                         <p:nvPr/>
                       </p:nvPicPr>
                       <p:blipFill>
-                        <a:blip r:embed="rId6"/>
+                        <a:blip r:embed="rId8"/>
                         <a:stretch>
                           <a:fillRect/>
                         </a:stretch>
@@ -16409,12 +16213,12 @@
             <a:graphicData uri="http://schemas.openxmlformats.org/presentationml/2006/ole">
               <mc:AlternateContent xmlns:mc="http://schemas.openxmlformats.org/markup-compatibility/2006">
                 <mc:Choice xmlns:v="urn:schemas-microsoft-com:vml" Requires="v">
-                  <p:oleObj spid="_x0000_s42114" name="Image" r:id="rId7" imgW="2400300" imgH="876300" progId="Photoshop.Image.13">
+                  <p:oleObj spid="_x0000_s42166" name="Image" r:id="rId9" imgW="2400300" imgH="876300" progId="Photoshop.Image.13">
                     <p:embed/>
                   </p:oleObj>
                 </mc:Choice>
                 <mc:Fallback>
-                  <p:oleObj name="Image" r:id="rId7" imgW="2400300" imgH="876300" progId="Photoshop.Image.13">
+                  <p:oleObj name="Image" r:id="rId9" imgW="2400300" imgH="876300" progId="Photoshop.Image.13">
                     <p:embed/>
                     <p:pic>
                       <p:nvPicPr>
@@ -16423,7 +16227,7 @@
                         <p:nvPr/>
                       </p:nvPicPr>
                       <p:blipFill>
-                        <a:blip r:embed="rId8"/>
+                        <a:blip r:embed="rId10"/>
                         <a:stretch>
                           <a:fillRect/>
                         </a:stretch>
@@ -16485,7 +16289,6 @@
                 <a:rPr lang="en-US" altLang="zh-CN" sz="2180" dirty="0"/>
                 <a:t>output:</a:t>
               </a:r>
-              <a:endParaRPr lang="en-US" altLang="zh-CN" sz="2180" dirty="0"/>
             </a:p>
           </p:txBody>
         </p:sp>
@@ -16505,12 +16308,12 @@
             <a:graphicData uri="http://schemas.openxmlformats.org/presentationml/2006/ole">
               <mc:AlternateContent xmlns:mc="http://schemas.openxmlformats.org/markup-compatibility/2006">
                 <mc:Choice xmlns:v="urn:schemas-microsoft-com:vml" Requires="v">
-                  <p:oleObj spid="_x0000_s42115" name="Image" r:id="rId9" imgW="1400175" imgH="523875" progId="Photoshop.Image.13">
+                  <p:oleObj spid="_x0000_s42167" name="Image" r:id="rId11" imgW="1400175" imgH="523875" progId="Photoshop.Image.13">
                     <p:embed/>
                   </p:oleObj>
                 </mc:Choice>
                 <mc:Fallback>
-                  <p:oleObj name="Image" r:id="rId9" imgW="1400175" imgH="523875" progId="Photoshop.Image.13">
+                  <p:oleObj name="Image" r:id="rId11" imgW="1400175" imgH="523875" progId="Photoshop.Image.13">
                     <p:embed/>
                     <p:pic>
                       <p:nvPicPr>
@@ -16519,7 +16322,7 @@
                         <p:nvPr/>
                       </p:nvPicPr>
                       <p:blipFill>
-                        <a:blip r:embed="rId10"/>
+                        <a:blip r:embed="rId12"/>
                         <a:stretch>
                           <a:fillRect/>
                         </a:stretch>
@@ -16991,17 +16794,6 @@
               </a:rPr>
               <a:t>or </a:t>
             </a:r>
-            <a:endParaRPr kumimoji="0" lang="en-US" altLang="zh-CN" sz="2540" b="0" i="0" u="none" strike="noStrike" kern="1200" cap="none" spc="0" normalizeH="0" noProof="0" dirty="0">
-              <a:ln>
-                <a:noFill/>
-              </a:ln>
-              <a:effectLst/>
-              <a:uLnTx/>
-              <a:uFillTx/>
-              <a:latin typeface="Calibri" panose="020F0502020204030204"/>
-              <a:ea typeface="宋体" panose="02010600030101010101" pitchFamily="2" charset="-122"/>
-              <a:cs typeface="+mn-cs"/>
-            </a:endParaRPr>
           </a:p>
           <a:p>
             <a:pPr marL="0" marR="0" lvl="0" indent="0" algn="l" defTabSz="914400" rtl="0" eaLnBrk="1" fontAlgn="auto" latinLnBrk="0" hangingPunct="1">
@@ -17847,6 +17639,8 @@
       </a:bgFillStyleLst>
     </a:fmtScheme>
   </a:themeElements>
+  <a:objectDefaults/>
+  <a:extraClrSchemeLst/>
   <a:extLst>
     <a:ext uri="{05A4C25C-085E-4340-85A3-A5531E510DB2}">
       <thm15:themeFamily xmlns:thm15="http://schemas.microsoft.com/office/thememl/2012/main" name="Office Theme" id="{62F939B6-93AF-4DB8-9C6B-D6C7DFDC589F}" vid="{4A3C46E8-61CC-4603-A589-7422A47A8E4A}"/>
@@ -18106,6 +17900,8 @@
       </a:bgFillStyleLst>
     </a:fmtScheme>
   </a:themeElements>
+  <a:objectDefaults/>
+  <a:extraClrSchemeLst/>
   <a:extLst>
     <a:ext uri="{05A4C25C-085E-4340-85A3-A5531E510DB2}">
       <thm15:themeFamily xmlns:thm15="http://schemas.microsoft.com/office/thememl/2012/main" name="Office Theme" id="{62F939B6-93AF-4DB8-9C6B-D6C7DFDC589F}" vid="{4A3C46E8-61CC-4603-A589-7422A47A8E4A}"/>

</xml_diff>